<commit_message>
Änderungen in der Präsi
</commit_message>
<xml_diff>
--- a/Präsentation/404Notfound_Praesi_Abschluss.pptx
+++ b/Präsentation/404Notfound_Praesi_Abschluss.pptx
@@ -24,10 +24,11 @@
     <p:sldId id="300" r:id="rId18"/>
     <p:sldId id="295" r:id="rId19"/>
     <p:sldId id="302" r:id="rId20"/>
-    <p:sldId id="303" r:id="rId21"/>
-    <p:sldId id="306" r:id="rId22"/>
-    <p:sldId id="307" r:id="rId23"/>
-    <p:sldId id="266" r:id="rId24"/>
+    <p:sldId id="312" r:id="rId21"/>
+    <p:sldId id="303" r:id="rId22"/>
+    <p:sldId id="306" r:id="rId23"/>
+    <p:sldId id="307" r:id="rId24"/>
+    <p:sldId id="266" r:id="rId25"/>
   </p:sldIdLst>
   <p:sldSz cx="12192000" cy="6858000"/>
   <p:notesSz cx="6858000" cy="9144000"/>
@@ -5980,6 +5981,36 @@
           </a:prstGeom>
         </p:spPr>
       </p:pic>
+      <p:pic>
+        <p:nvPicPr>
+          <p:cNvPr id="7" name="Grafik 6">
+            <a:extLst>
+              <a:ext uri="{FF2B5EF4-FFF2-40B4-BE49-F238E27FC236}">
+                <a16:creationId xmlns:a16="http://schemas.microsoft.com/office/drawing/2014/main" id="{2C9E8F65-7D62-4927-A924-7ADA7568491E}"/>
+              </a:ext>
+            </a:extLst>
+          </p:cNvPr>
+          <p:cNvPicPr>
+            <a:picLocks noChangeAspect="1"/>
+          </p:cNvPicPr>
+          <p:nvPr/>
+        </p:nvPicPr>
+        <p:blipFill>
+          <a:blip r:embed="rId3"/>
+          <a:stretch>
+            <a:fillRect/>
+          </a:stretch>
+        </p:blipFill>
+        <p:spPr>
+          <a:xfrm>
+            <a:off x="4110925" y="1624480"/>
+            <a:ext cx="7847810" cy="1609343"/>
+          </a:xfrm>
+          <a:prstGeom prst="rect">
+            <a:avLst/>
+          </a:prstGeom>
+        </p:spPr>
+      </p:pic>
     </p:spTree>
     <p:extLst>
       <p:ext uri="{BB962C8B-B14F-4D97-AF65-F5344CB8AC3E}">
@@ -6379,7 +6410,7 @@
           <p:cNvPr id="2" name="Titel 1">
             <a:extLst>
               <a:ext uri="{FF2B5EF4-FFF2-40B4-BE49-F238E27FC236}">
-                <a16:creationId xmlns:a16="http://schemas.microsoft.com/office/drawing/2014/main" id="{013C42BB-D6A8-43C2-9DF8-83592F84AC26}"/>
+                <a16:creationId xmlns:a16="http://schemas.microsoft.com/office/drawing/2014/main" id="{0FD4166A-ADC6-4CB7-92A4-E5F8D80DA625}"/>
               </a:ext>
             </a:extLst>
           </p:cNvPr>
@@ -6407,7 +6438,7 @@
           <p:cNvPr id="3" name="Inhaltsplatzhalter 2">
             <a:extLst>
               <a:ext uri="{FF2B5EF4-FFF2-40B4-BE49-F238E27FC236}">
-                <a16:creationId xmlns:a16="http://schemas.microsoft.com/office/drawing/2014/main" id="{8DC6A81D-1E1A-4FCF-83A9-CCE046E021C7}"/>
+                <a16:creationId xmlns:a16="http://schemas.microsoft.com/office/drawing/2014/main" id="{B0FFB8E6-34A3-44D0-8CF9-C574903D04A7}"/>
               </a:ext>
             </a:extLst>
           </p:cNvPr>
@@ -6424,68 +6455,46 @@
           <a:lstStyle/>
           <a:p>
             <a:r>
-              <a:rPr lang="de-DE" dirty="0" err="1"/>
-              <a:t>Lessons</a:t>
-            </a:r>
-            <a:r>
               <a:rPr lang="de-DE" dirty="0"/>
-              <a:t> </a:t>
-            </a:r>
-            <a:r>
-              <a:rPr lang="de-DE" dirty="0" err="1"/>
-              <a:t>Learned</a:t>
-            </a:r>
-            <a:endParaRPr lang="de-DE" dirty="0"/>
-          </a:p>
-          <a:p>
-            <a:pPr lvl="1"/>
-            <a:r>
-              <a:rPr lang="de-DE" b="0" i="0" dirty="0">
-                <a:effectLst/>
-              </a:rPr>
-              <a:t>Listen die in einer Klasse immer wieder benutzt werden, sollten als Attribut dieser Klasse verwendet werden!</a:t>
-            </a:r>
-          </a:p>
-          <a:p>
-            <a:pPr lvl="1"/>
-            <a:r>
-              <a:rPr lang="de-DE" b="0" i="0" dirty="0">
-                <a:effectLst/>
-              </a:rPr>
-              <a:t>Keep </a:t>
-            </a:r>
-            <a:r>
-              <a:rPr lang="de-DE" b="0" i="0" dirty="0" err="1">
-                <a:effectLst/>
-              </a:rPr>
-              <a:t>it</a:t>
-            </a:r>
-            <a:r>
-              <a:rPr lang="de-DE" b="0" i="0" dirty="0">
-                <a:effectLst/>
-              </a:rPr>
-              <a:t> </a:t>
-            </a:r>
-            <a:r>
-              <a:rPr lang="de-DE" b="0" i="0" dirty="0" err="1">
-                <a:effectLst/>
-              </a:rPr>
-              <a:t>short</a:t>
-            </a:r>
-            <a:r>
-              <a:rPr lang="de-DE" b="0" i="0" dirty="0">
-                <a:effectLst/>
-              </a:rPr>
-              <a:t> and simple --&gt; Kleine Funktionen schreiben, die in Komplexeren Methoden zusammen verwendet werden können!</a:t>
-            </a:r>
-            <a:endParaRPr lang="de-DE" dirty="0"/>
-          </a:p>
-        </p:txBody>
-      </p:sp>
+              <a:t>Repository</a:t>
+            </a:r>
+          </a:p>
+        </p:txBody>
+      </p:sp>
+      <p:pic>
+        <p:nvPicPr>
+          <p:cNvPr id="5" name="Grafik 4">
+            <a:extLst>
+              <a:ext uri="{FF2B5EF4-FFF2-40B4-BE49-F238E27FC236}">
+                <a16:creationId xmlns:a16="http://schemas.microsoft.com/office/drawing/2014/main" id="{883B58EB-BC30-4D29-9848-D3275D410FC9}"/>
+              </a:ext>
+            </a:extLst>
+          </p:cNvPr>
+          <p:cNvPicPr>
+            <a:picLocks noChangeAspect="1"/>
+          </p:cNvPicPr>
+          <p:nvPr/>
+        </p:nvPicPr>
+        <p:blipFill>
+          <a:blip r:embed="rId2"/>
+          <a:stretch>
+            <a:fillRect/>
+          </a:stretch>
+        </p:blipFill>
+        <p:spPr>
+          <a:xfrm>
+            <a:off x="2791326" y="1823673"/>
+            <a:ext cx="9200147" cy="4876770"/>
+          </a:xfrm>
+          <a:prstGeom prst="rect">
+            <a:avLst/>
+          </a:prstGeom>
+        </p:spPr>
+      </p:pic>
     </p:spTree>
     <p:extLst>
       <p:ext uri="{BB962C8B-B14F-4D97-AF65-F5344CB8AC3E}">
-        <p14:creationId xmlns:p14="http://schemas.microsoft.com/office/powerpoint/2010/main" val="1456039882"/>
+        <p14:creationId xmlns:p14="http://schemas.microsoft.com/office/powerpoint/2010/main" val="2188303408"/>
       </p:ext>
     </p:extLst>
   </p:cSld>
@@ -6517,7 +6526,7 @@
           <p:cNvPr id="2" name="Titel 1">
             <a:extLst>
               <a:ext uri="{FF2B5EF4-FFF2-40B4-BE49-F238E27FC236}">
-                <a16:creationId xmlns:a16="http://schemas.microsoft.com/office/drawing/2014/main" id="{CA4211CC-74FE-4331-8B1F-832E96E8DF78}"/>
+                <a16:creationId xmlns:a16="http://schemas.microsoft.com/office/drawing/2014/main" id="{013C42BB-D6A8-43C2-9DF8-83592F84AC26}"/>
               </a:ext>
             </a:extLst>
           </p:cNvPr>
@@ -6545,7 +6554,7 @@
           <p:cNvPr id="3" name="Inhaltsplatzhalter 2">
             <a:extLst>
               <a:ext uri="{FF2B5EF4-FFF2-40B4-BE49-F238E27FC236}">
-                <a16:creationId xmlns:a16="http://schemas.microsoft.com/office/drawing/2014/main" id="{90F36DFE-FFFF-44DA-9B19-AB3B5C477281}"/>
+                <a16:creationId xmlns:a16="http://schemas.microsoft.com/office/drawing/2014/main" id="{8DC6A81D-1E1A-4FCF-83A9-CCE046E021C7}"/>
               </a:ext>
             </a:extLst>
           </p:cNvPr>
@@ -6562,43 +6571,78 @@
           <a:lstStyle/>
           <a:p>
             <a:r>
+              <a:rPr lang="de-DE" dirty="0" err="1"/>
+              <a:t>Lessons</a:t>
+            </a:r>
+            <a:r>
               <a:rPr lang="de-DE" dirty="0"/>
-              <a:t>Positives</a:t>
-            </a:r>
+              <a:t> </a:t>
+            </a:r>
+            <a:r>
+              <a:rPr lang="de-DE" dirty="0" err="1"/>
+              <a:t>Learned</a:t>
+            </a:r>
+            <a:endParaRPr lang="de-DE" dirty="0"/>
           </a:p>
           <a:p>
             <a:pPr lvl="1"/>
             <a:r>
+              <a:rPr lang="de-DE" b="0" i="0" dirty="0">
+                <a:effectLst/>
+              </a:rPr>
+              <a:t>Listen die in einer Klasse immer wieder benutzt werden, sollten als Attribut dieser Klasse verwendet werden!</a:t>
+            </a:r>
+          </a:p>
+          <a:p>
+            <a:pPr lvl="1"/>
+            <a:r>
+              <a:rPr lang="de-DE" b="0" i="0" dirty="0">
+                <a:effectLst/>
+              </a:rPr>
+              <a:t>Keep </a:t>
+            </a:r>
+            <a:r>
+              <a:rPr lang="de-DE" b="0" i="0" dirty="0" err="1">
+                <a:effectLst/>
+              </a:rPr>
+              <a:t>it</a:t>
+            </a:r>
+            <a:r>
+              <a:rPr lang="de-DE" b="0" i="0" dirty="0">
+                <a:effectLst/>
+              </a:rPr>
+              <a:t> </a:t>
+            </a:r>
+            <a:r>
+              <a:rPr lang="de-DE" b="0" i="0" dirty="0" err="1">
+                <a:effectLst/>
+              </a:rPr>
+              <a:t>short</a:t>
+            </a:r>
+            <a:r>
+              <a:rPr lang="de-DE" b="0" i="0" dirty="0">
+                <a:effectLst/>
+              </a:rPr>
+              <a:t> and simple </a:t>
+            </a:r>
+            <a:r>
+              <a:rPr lang="de-DE" dirty="0">
+                <a:sym typeface="Wingdings" panose="05000000000000000000" pitchFamily="2" charset="2"/>
+              </a:rPr>
+              <a:t></a:t>
+            </a:r>
+            <a:r>
+              <a:rPr lang="de-DE" b="0" i="0" dirty="0">
+                <a:effectLst/>
+              </a:rPr>
+              <a:t> Kleine Funktionen schreiben, die in Komplexeren Methoden zusammen verwendet werden können!</a:t>
+            </a:r>
+          </a:p>
+          <a:p>
+            <a:pPr lvl="1"/>
+            <a:r>
               <a:rPr lang="de-DE" dirty="0"/>
-              <a:t>gute Planung</a:t>
-            </a:r>
-          </a:p>
-          <a:p>
-            <a:pPr lvl="1"/>
-            <a:r>
-              <a:rPr lang="de-DE" dirty="0"/>
-              <a:t>harmonisches miteinander in der Gruppe</a:t>
-            </a:r>
-          </a:p>
-          <a:p>
-            <a:pPr lvl="1"/>
-            <a:r>
-              <a:rPr lang="de-DE" dirty="0"/>
-              <a:t>stetige Hilfe untereinander</a:t>
-            </a:r>
-          </a:p>
-          <a:p>
-            <a:pPr lvl="1"/>
-            <a:r>
-              <a:rPr lang="de-DE" dirty="0"/>
-              <a:t>sehr gute Kommunikation untereinander</a:t>
-            </a:r>
-          </a:p>
-          <a:p>
-            <a:pPr lvl="1"/>
-            <a:r>
-              <a:rPr lang="de-DE" dirty="0"/>
-              <a:t>Engagement sehr hoch bei jedem</a:t>
+              <a:t>Auf Tipps von der IDE achten</a:t>
             </a:r>
           </a:p>
         </p:txBody>
@@ -6606,7 +6650,7 @@
     </p:spTree>
     <p:extLst>
       <p:ext uri="{BB962C8B-B14F-4D97-AF65-F5344CB8AC3E}">
-        <p14:creationId xmlns:p14="http://schemas.microsoft.com/office/powerpoint/2010/main" val="1245784456"/>
+        <p14:creationId xmlns:p14="http://schemas.microsoft.com/office/powerpoint/2010/main" val="1456039882"/>
       </p:ext>
     </p:extLst>
   </p:cSld>
@@ -6638,6 +6682,127 @@
           <p:cNvPr id="2" name="Titel 1">
             <a:extLst>
               <a:ext uri="{FF2B5EF4-FFF2-40B4-BE49-F238E27FC236}">
+                <a16:creationId xmlns:a16="http://schemas.microsoft.com/office/drawing/2014/main" id="{CA4211CC-74FE-4331-8B1F-832E96E8DF78}"/>
+              </a:ext>
+            </a:extLst>
+          </p:cNvPr>
+          <p:cNvSpPr>
+            <a:spLocks noGrp="1"/>
+          </p:cNvSpPr>
+          <p:nvPr>
+            <p:ph type="title"/>
+          </p:nvPr>
+        </p:nvSpPr>
+        <p:spPr/>
+        <p:txBody>
+          <a:bodyPr/>
+          <a:lstStyle/>
+          <a:p>
+            <a:r>
+              <a:rPr lang="de-DE" dirty="0"/>
+              <a:t>Zusammenfassung</a:t>
+            </a:r>
+          </a:p>
+        </p:txBody>
+      </p:sp>
+      <p:sp>
+        <p:nvSpPr>
+          <p:cNvPr id="3" name="Inhaltsplatzhalter 2">
+            <a:extLst>
+              <a:ext uri="{FF2B5EF4-FFF2-40B4-BE49-F238E27FC236}">
+                <a16:creationId xmlns:a16="http://schemas.microsoft.com/office/drawing/2014/main" id="{90F36DFE-FFFF-44DA-9B19-AB3B5C477281}"/>
+              </a:ext>
+            </a:extLst>
+          </p:cNvPr>
+          <p:cNvSpPr>
+            <a:spLocks noGrp="1"/>
+          </p:cNvSpPr>
+          <p:nvPr>
+            <p:ph idx="1"/>
+          </p:nvPr>
+        </p:nvSpPr>
+        <p:spPr/>
+        <p:txBody>
+          <a:bodyPr/>
+          <a:lstStyle/>
+          <a:p>
+            <a:r>
+              <a:rPr lang="de-DE" dirty="0"/>
+              <a:t>Positives</a:t>
+            </a:r>
+          </a:p>
+          <a:p>
+            <a:pPr lvl="1"/>
+            <a:r>
+              <a:rPr lang="de-DE" dirty="0"/>
+              <a:t>gute Planung</a:t>
+            </a:r>
+          </a:p>
+          <a:p>
+            <a:pPr lvl="1"/>
+            <a:r>
+              <a:rPr lang="de-DE" dirty="0"/>
+              <a:t>harmonisches miteinander in der Gruppe</a:t>
+            </a:r>
+          </a:p>
+          <a:p>
+            <a:pPr lvl="1"/>
+            <a:r>
+              <a:rPr lang="de-DE" dirty="0"/>
+              <a:t>stetige Hilfe untereinander</a:t>
+            </a:r>
+          </a:p>
+          <a:p>
+            <a:pPr lvl="1"/>
+            <a:r>
+              <a:rPr lang="de-DE" dirty="0"/>
+              <a:t>sehr gute Kommunikation untereinander</a:t>
+            </a:r>
+          </a:p>
+          <a:p>
+            <a:pPr lvl="1"/>
+            <a:r>
+              <a:rPr lang="de-DE" dirty="0"/>
+              <a:t>Engagement sehr hoch bei jedem</a:t>
+            </a:r>
+          </a:p>
+        </p:txBody>
+      </p:sp>
+    </p:spTree>
+    <p:extLst>
+      <p:ext uri="{BB962C8B-B14F-4D97-AF65-F5344CB8AC3E}">
+        <p14:creationId xmlns:p14="http://schemas.microsoft.com/office/powerpoint/2010/main" val="1245784456"/>
+      </p:ext>
+    </p:extLst>
+  </p:cSld>
+  <p:clrMapOvr>
+    <a:masterClrMapping/>
+  </p:clrMapOvr>
+</p:sld>
+</file>
+
+<file path=ppt/slides/slide23.xml><?xml version="1.0" encoding="utf-8"?>
+<p:sld xmlns:a="http://schemas.openxmlformats.org/drawingml/2006/main" xmlns:r="http://schemas.openxmlformats.org/officeDocument/2006/relationships" xmlns:p="http://schemas.openxmlformats.org/presentationml/2006/main">
+  <p:cSld>
+    <p:spTree>
+      <p:nvGrpSpPr>
+        <p:cNvPr id="1" name=""/>
+        <p:cNvGrpSpPr/>
+        <p:nvPr/>
+      </p:nvGrpSpPr>
+      <p:grpSpPr>
+        <a:xfrm>
+          <a:off x="0" y="0"/>
+          <a:ext cx="0" cy="0"/>
+          <a:chOff x="0" y="0"/>
+          <a:chExt cx="0" cy="0"/>
+        </a:xfrm>
+      </p:grpSpPr>
+      <p:sp>
+        <p:nvSpPr>
+          <p:cNvPr id="2" name="Titel 1">
+            <a:extLst>
+              <a:ext uri="{FF2B5EF4-FFF2-40B4-BE49-F238E27FC236}">
                 <a16:creationId xmlns:a16="http://schemas.microsoft.com/office/drawing/2014/main" id="{598578BA-F59B-48C3-BD58-F8D9F078FDB7}"/>
               </a:ext>
             </a:extLst>
@@ -6727,7 +6892,7 @@
 </p:sld>
 </file>
 
-<file path=ppt/slides/slide23.xml><?xml version="1.0" encoding="utf-8"?>
+<file path=ppt/slides/slide24.xml><?xml version="1.0" encoding="utf-8"?>
 <p:sld xmlns:a="http://schemas.openxmlformats.org/drawingml/2006/main" xmlns:r="http://schemas.openxmlformats.org/officeDocument/2006/relationships" xmlns:p="http://schemas.openxmlformats.org/presentationml/2006/main">
   <p:cSld>
     <p:spTree>

</xml_diff>